<commit_message>
added some EJB properties
</commit_message>
<xml_diff>
--- a/docs/documentation.pptx
+++ b/docs/documentation.pptx
@@ -13018,7 +13018,7 @@
         </p:spPr>
         <p:txBody>
           <a:bodyPr>
-            <a:normAutofit fontScale="85000" lnSpcReduction="20000"/>
+            <a:normAutofit fontScale="77500" lnSpcReduction="20000"/>
           </a:bodyPr>
           <a:lstStyle/>
           <a:p>
@@ -13049,8 +13049,13 @@
             </a:r>
             <a:r>
               <a:rPr lang="en-GB" dirty="0"/>
-              <a:t>is necessary to retrieve the list of orders associated to a customer</a:t>
-            </a:r>
+              <a:t>can be omitted because it isn’t necessary to retrieve all the orders associated to </a:t>
+            </a:r>
+            <a:r>
+              <a:rPr lang="en-GB"/>
+              <a:t>a customer</a:t>
+            </a:r>
+            <a:endParaRPr lang="en-GB" dirty="0"/>
           </a:p>
           <a:p>
             <a:pPr lvl="1"/>

</xml_diff>